<commit_message>
moved week2 data folder
</commit_message>
<xml_diff>
--- a/tutorials/week1/week01-tutorial.pptx
+++ b/tutorials/week1/week01-tutorial.pptx
@@ -5,15 +5,16 @@
     <p:sldMasterId id="2147483661" r:id="rId1"/>
   </p:sldMasterIdLst>
   <p:notesMasterIdLst>
-    <p:notesMasterId r:id="rId8"/>
+    <p:notesMasterId r:id="rId9"/>
   </p:notesMasterIdLst>
   <p:sldIdLst>
     <p:sldId id="257" r:id="rId2"/>
-    <p:sldId id="262" r:id="rId3"/>
-    <p:sldId id="258" r:id="rId4"/>
+    <p:sldId id="258" r:id="rId3"/>
+    <p:sldId id="262" r:id="rId4"/>
     <p:sldId id="260" r:id="rId5"/>
     <p:sldId id="259" r:id="rId6"/>
     <p:sldId id="261" r:id="rId7"/>
+    <p:sldId id="263" r:id="rId8"/>
   </p:sldIdLst>
   <p:sldSz cx="9144000" cy="6858000" type="screen4x3"/>
   <p:notesSz cx="6858000" cy="9144000"/>
@@ -112,6 +113,11 @@
       </a:defRPr>
     </a:lvl9pPr>
   </p:defaultTextStyle>
+  <p:extLst>
+    <p:ext uri="{EFAFB233-063F-42B5-8137-9DF3F51BA10A}">
+      <p15:sldGuideLst xmlns:p15="http://schemas.microsoft.com/office/powerpoint/2012/main"/>
+    </p:ext>
+  </p:extLst>
 </p:presentation>
 </file>
 
@@ -197,7 +203,7 @@
           <a:p>
             <a:fld id="{AC508C49-E8E1-7A44-A853-11D09BE4045B}" type="datetimeFigureOut">
               <a:rPr kumimoji="1" lang="zh-CN" altLang="en-US" smtClean="0"/>
-              <a:t>2025/7/25</a:t>
+              <a:t>2025/8/1</a:t>
             </a:fld>
             <a:endParaRPr kumimoji="1" lang="zh-CN" altLang="en-US"/>
           </a:p>
@@ -684,7 +690,7 @@
           <a:p>
             <a:fld id="{595ABECA-8C95-9C46-B151-62A4E6B6A47A}" type="datetimeFigureOut">
               <a:rPr kumimoji="1" lang="zh-CN" altLang="en-US" smtClean="0"/>
-              <a:t>2025/7/25</a:t>
+              <a:t>2025/8/1</a:t>
             </a:fld>
             <a:endParaRPr kumimoji="1" lang="zh-CN" altLang="en-US"/>
           </a:p>
@@ -854,7 +860,7 @@
           <a:p>
             <a:fld id="{595ABECA-8C95-9C46-B151-62A4E6B6A47A}" type="datetimeFigureOut">
               <a:rPr kumimoji="1" lang="zh-CN" altLang="en-US" smtClean="0"/>
-              <a:t>2025/7/25</a:t>
+              <a:t>2025/8/1</a:t>
             </a:fld>
             <a:endParaRPr kumimoji="1" lang="zh-CN" altLang="en-US"/>
           </a:p>
@@ -1034,7 +1040,7 @@
           <a:p>
             <a:fld id="{595ABECA-8C95-9C46-B151-62A4E6B6A47A}" type="datetimeFigureOut">
               <a:rPr kumimoji="1" lang="zh-CN" altLang="en-US" smtClean="0"/>
-              <a:t>2025/7/25</a:t>
+              <a:t>2025/8/1</a:t>
             </a:fld>
             <a:endParaRPr kumimoji="1" lang="zh-CN" altLang="en-US"/>
           </a:p>
@@ -1406,7 +1412,7 @@
           <a:p>
             <a:fld id="{595ABECA-8C95-9C46-B151-62A4E6B6A47A}" type="datetimeFigureOut">
               <a:rPr kumimoji="1" lang="zh-CN" altLang="en-US" smtClean="0"/>
-              <a:t>2025/7/25</a:t>
+              <a:t>2025/8/1</a:t>
             </a:fld>
             <a:endParaRPr kumimoji="1" lang="zh-CN" altLang="en-US"/>
           </a:p>
@@ -1650,7 +1656,7 @@
           <a:p>
             <a:fld id="{595ABECA-8C95-9C46-B151-62A4E6B6A47A}" type="datetimeFigureOut">
               <a:rPr kumimoji="1" lang="zh-CN" altLang="en-US" smtClean="0"/>
-              <a:t>2025/7/25</a:t>
+              <a:t>2025/8/1</a:t>
             </a:fld>
             <a:endParaRPr kumimoji="1" lang="zh-CN" altLang="en-US"/>
           </a:p>
@@ -1882,7 +1888,7 @@
           <a:p>
             <a:fld id="{595ABECA-8C95-9C46-B151-62A4E6B6A47A}" type="datetimeFigureOut">
               <a:rPr kumimoji="1" lang="zh-CN" altLang="en-US" smtClean="0"/>
-              <a:t>2025/7/25</a:t>
+              <a:t>2025/8/1</a:t>
             </a:fld>
             <a:endParaRPr kumimoji="1" lang="zh-CN" altLang="en-US"/>
           </a:p>
@@ -2249,7 +2255,7 @@
           <a:p>
             <a:fld id="{595ABECA-8C95-9C46-B151-62A4E6B6A47A}" type="datetimeFigureOut">
               <a:rPr kumimoji="1" lang="zh-CN" altLang="en-US" smtClean="0"/>
-              <a:t>2025/7/25</a:t>
+              <a:t>2025/8/1</a:t>
             </a:fld>
             <a:endParaRPr kumimoji="1" lang="zh-CN" altLang="en-US"/>
           </a:p>
@@ -2367,7 +2373,7 @@
           <a:p>
             <a:fld id="{595ABECA-8C95-9C46-B151-62A4E6B6A47A}" type="datetimeFigureOut">
               <a:rPr kumimoji="1" lang="zh-CN" altLang="en-US" smtClean="0"/>
-              <a:t>2025/7/25</a:t>
+              <a:t>2025/8/1</a:t>
             </a:fld>
             <a:endParaRPr kumimoji="1" lang="zh-CN" altLang="en-US"/>
           </a:p>
@@ -2462,7 +2468,7 @@
           <a:p>
             <a:fld id="{595ABECA-8C95-9C46-B151-62A4E6B6A47A}" type="datetimeFigureOut">
               <a:rPr kumimoji="1" lang="zh-CN" altLang="en-US" smtClean="0"/>
-              <a:t>2025/7/25</a:t>
+              <a:t>2025/8/1</a:t>
             </a:fld>
             <a:endParaRPr kumimoji="1" lang="zh-CN" altLang="en-US"/>
           </a:p>
@@ -2739,7 +2745,7 @@
           <a:p>
             <a:fld id="{595ABECA-8C95-9C46-B151-62A4E6B6A47A}" type="datetimeFigureOut">
               <a:rPr kumimoji="1" lang="zh-CN" altLang="en-US" smtClean="0"/>
-              <a:t>2025/7/25</a:t>
+              <a:t>2025/8/1</a:t>
             </a:fld>
             <a:endParaRPr kumimoji="1" lang="zh-CN" altLang="en-US"/>
           </a:p>
@@ -2996,7 +3002,7 @@
           <a:p>
             <a:fld id="{595ABECA-8C95-9C46-B151-62A4E6B6A47A}" type="datetimeFigureOut">
               <a:rPr kumimoji="1" lang="zh-CN" altLang="en-US" smtClean="0"/>
-              <a:t>2025/7/25</a:t>
+              <a:t>2025/8/1</a:t>
             </a:fld>
             <a:endParaRPr kumimoji="1" lang="zh-CN" altLang="en-US"/>
           </a:p>
@@ -3209,7 +3215,7 @@
           <a:p>
             <a:fld id="{595ABECA-8C95-9C46-B151-62A4E6B6A47A}" type="datetimeFigureOut">
               <a:rPr kumimoji="1" lang="zh-CN" altLang="en-US" smtClean="0"/>
-              <a:t>2025/7/25</a:t>
+              <a:t>2025/8/1</a:t>
             </a:fld>
             <a:endParaRPr kumimoji="1" lang="zh-CN" altLang="en-US"/>
           </a:p>
@@ -3695,13 +3701,7 @@
   <p:cSld>
     <p:spTree>
       <p:nvGrpSpPr>
-        <p:cNvPr id="1" name="">
-          <a:extLst>
-            <a:ext uri="{FF2B5EF4-FFF2-40B4-BE49-F238E27FC236}">
-              <a16:creationId xmlns:a16="http://schemas.microsoft.com/office/drawing/2014/main" id="{BDF5C15F-41C7-811F-1447-B6D9393A7503}"/>
-            </a:ext>
-          </a:extLst>
-        </p:cNvPr>
+        <p:cNvPr id="1" name=""/>
         <p:cNvGrpSpPr/>
         <p:nvPr/>
       </p:nvGrpSpPr>
@@ -3718,7 +3718,7 @@
           <p:cNvPr id="4" name="Title 1">
             <a:extLst>
               <a:ext uri="{FF2B5EF4-FFF2-40B4-BE49-F238E27FC236}">
-                <a16:creationId xmlns:a16="http://schemas.microsoft.com/office/drawing/2014/main" id="{CCCB76D0-3B21-F0D9-6AA7-183657D2C783}"/>
+                <a16:creationId xmlns:a16="http://schemas.microsoft.com/office/drawing/2014/main" id="{40885E59-D390-8778-6694-0771BFF14E31}"/>
               </a:ext>
             </a:extLst>
           </p:cNvPr>
@@ -3767,7 +3767,7 @@
                   <a:srgbClr val="FF0000"/>
                 </a:solidFill>
               </a:rPr>
-              <a:t>Structure</a:t>
+              <a:t>About your tutor</a:t>
             </a:r>
           </a:p>
         </p:txBody>
@@ -3777,7 +3777,7 @@
           <p:cNvPr id="5" name="Content Placeholder 2">
             <a:extLst>
               <a:ext uri="{FF2B5EF4-FFF2-40B4-BE49-F238E27FC236}">
-                <a16:creationId xmlns:a16="http://schemas.microsoft.com/office/drawing/2014/main" id="{1A941154-C377-9A0F-071F-40F31DAF75A5}"/>
+                <a16:creationId xmlns:a16="http://schemas.microsoft.com/office/drawing/2014/main" id="{6CB1BC0D-A537-6A04-2141-A95D96D0F4A7}"/>
               </a:ext>
             </a:extLst>
           </p:cNvPr>
@@ -3964,64 +3964,52 @@
             </a:lvl9pPr>
           </a:lstStyle>
           <a:p>
-            <a:pPr marL="514350" indent="-514350">
+            <a:pPr>
               <a:lnSpc>
                 <a:spcPct val="100000"/>
               </a:lnSpc>
-              <a:buFont typeface="+mj-lt"/>
-              <a:buAutoNum type="arabicPeriod"/>
             </a:pPr>
             <a:r>
               <a:rPr lang="en-US" dirty="0"/>
-              <a:t>Setup your computer</a:t>
-            </a:r>
-          </a:p>
-          <a:p>
-            <a:pPr marL="514350" indent="-514350">
+              <a:t>Name: Liwen Li</a:t>
+            </a:r>
+            <a:endParaRPr lang="en-AU" dirty="0"/>
+          </a:p>
+          <a:p>
+            <a:pPr marL="285750" indent="-285750">
               <a:lnSpc>
-                <a:spcPct val="100000"/>
+                <a:spcPct val="150000"/>
               </a:lnSpc>
-              <a:buFont typeface="+mj-lt"/>
-              <a:buAutoNum type="arabicPeriod"/>
             </a:pPr>
             <a:r>
               <a:rPr lang="en-US" dirty="0"/>
-              <a:t>Selection Sort</a:t>
-            </a:r>
-          </a:p>
-          <a:p>
-            <a:pPr marL="514350" indent="-514350">
+              <a:t>Email: </a:t>
+            </a:r>
+            <a:r>
+              <a:rPr lang="en-US" dirty="0">
+                <a:hlinkClick r:id="rId2"/>
+              </a:rPr>
+              <a:t>liwen.li.1@unimelb.edu.au</a:t>
+            </a:r>
+            <a:endParaRPr lang="en-US" dirty="0"/>
+          </a:p>
+          <a:p>
+            <a:pPr marL="285750" indent="-285750">
               <a:lnSpc>
-                <a:spcPct val="100000"/>
+                <a:spcPct val="150000"/>
               </a:lnSpc>
-              <a:buFont typeface="+mj-lt"/>
-              <a:buAutoNum type="arabicPeriod"/>
             </a:pPr>
             <a:r>
               <a:rPr lang="en-US" dirty="0"/>
-              <a:t>Complexity evaluation</a:t>
-            </a:r>
-          </a:p>
-          <a:p>
-            <a:pPr marL="514350" indent="-514350">
-              <a:lnSpc>
-                <a:spcPct val="100000"/>
-              </a:lnSpc>
-              <a:buFont typeface="+mj-lt"/>
-              <a:buAutoNum type="arabicPeriod"/>
-            </a:pPr>
-            <a:r>
-              <a:rPr lang="en-US" dirty="0"/>
-              <a:t>Merge Sort (Extension)</a:t>
-            </a:r>
-            <a:endParaRPr lang="en-AU" dirty="0"/>
+              <a:t>Master of Science (Bioinformatics)</a:t>
+            </a:r>
           </a:p>
         </p:txBody>
       </p:sp>
     </p:spTree>
     <p:extLst>
       <p:ext uri="{BB962C8B-B14F-4D97-AF65-F5344CB8AC3E}">
-        <p14:creationId xmlns:p14="http://schemas.microsoft.com/office/powerpoint/2010/main" val="4248554318"/>
+        <p14:creationId xmlns:p14="http://schemas.microsoft.com/office/powerpoint/2010/main" val="2855224905"/>
       </p:ext>
     </p:extLst>
   </p:cSld>
@@ -4036,7 +4024,13 @@
   <p:cSld>
     <p:spTree>
       <p:nvGrpSpPr>
-        <p:cNvPr id="1" name=""/>
+        <p:cNvPr id="1" name="">
+          <a:extLst>
+            <a:ext uri="{FF2B5EF4-FFF2-40B4-BE49-F238E27FC236}">
+              <a16:creationId xmlns:a16="http://schemas.microsoft.com/office/drawing/2014/main" id="{BDF5C15F-41C7-811F-1447-B6D9393A7503}"/>
+            </a:ext>
+          </a:extLst>
+        </p:cNvPr>
         <p:cNvGrpSpPr/>
         <p:nvPr/>
       </p:nvGrpSpPr>
@@ -4053,7 +4047,7 @@
           <p:cNvPr id="4" name="Title 1">
             <a:extLst>
               <a:ext uri="{FF2B5EF4-FFF2-40B4-BE49-F238E27FC236}">
-                <a16:creationId xmlns:a16="http://schemas.microsoft.com/office/drawing/2014/main" id="{40885E59-D390-8778-6694-0771BFF14E31}"/>
+                <a16:creationId xmlns:a16="http://schemas.microsoft.com/office/drawing/2014/main" id="{CCCB76D0-3B21-F0D9-6AA7-183657D2C783}"/>
               </a:ext>
             </a:extLst>
           </p:cNvPr>
@@ -4102,7 +4096,7 @@
                   <a:srgbClr val="FF0000"/>
                 </a:solidFill>
               </a:rPr>
-              <a:t>About your tutor</a:t>
+              <a:t>Structure</a:t>
             </a:r>
           </a:p>
         </p:txBody>
@@ -4112,7 +4106,7 @@
           <p:cNvPr id="5" name="Content Placeholder 2">
             <a:extLst>
               <a:ext uri="{FF2B5EF4-FFF2-40B4-BE49-F238E27FC236}">
-                <a16:creationId xmlns:a16="http://schemas.microsoft.com/office/drawing/2014/main" id="{6CB1BC0D-A537-6A04-2141-A95D96D0F4A7}"/>
+                <a16:creationId xmlns:a16="http://schemas.microsoft.com/office/drawing/2014/main" id="{1A941154-C377-9A0F-071F-40F31DAF75A5}"/>
               </a:ext>
             </a:extLst>
           </p:cNvPr>
@@ -4299,52 +4293,64 @@
             </a:lvl9pPr>
           </a:lstStyle>
           <a:p>
-            <a:pPr>
+            <a:pPr marL="514350" indent="-514350">
               <a:lnSpc>
                 <a:spcPct val="100000"/>
               </a:lnSpc>
+              <a:buFont typeface="+mj-lt"/>
+              <a:buAutoNum type="arabicPeriod"/>
             </a:pPr>
             <a:r>
               <a:rPr lang="en-US" dirty="0"/>
-              <a:t>Name: Liwen Li</a:t>
+              <a:t>Setup your computer</a:t>
+            </a:r>
+          </a:p>
+          <a:p>
+            <a:pPr marL="514350" indent="-514350">
+              <a:lnSpc>
+                <a:spcPct val="100000"/>
+              </a:lnSpc>
+              <a:buFont typeface="+mj-lt"/>
+              <a:buAutoNum type="arabicPeriod"/>
+            </a:pPr>
+            <a:r>
+              <a:rPr lang="en-US" dirty="0"/>
+              <a:t>Selection Sort</a:t>
+            </a:r>
+          </a:p>
+          <a:p>
+            <a:pPr marL="514350" indent="-514350">
+              <a:lnSpc>
+                <a:spcPct val="100000"/>
+              </a:lnSpc>
+              <a:buFont typeface="+mj-lt"/>
+              <a:buAutoNum type="arabicPeriod"/>
+            </a:pPr>
+            <a:r>
+              <a:rPr lang="en-US" dirty="0"/>
+              <a:t>Complexity evaluation</a:t>
+            </a:r>
+          </a:p>
+          <a:p>
+            <a:pPr marL="514350" indent="-514350">
+              <a:lnSpc>
+                <a:spcPct val="100000"/>
+              </a:lnSpc>
+              <a:buFont typeface="+mj-lt"/>
+              <a:buAutoNum type="arabicPeriod"/>
+            </a:pPr>
+            <a:r>
+              <a:rPr lang="en-US" dirty="0"/>
+              <a:t>Merge Sort (Extension)</a:t>
             </a:r>
             <a:endParaRPr lang="en-AU" dirty="0"/>
-          </a:p>
-          <a:p>
-            <a:pPr marL="285750" indent="-285750">
-              <a:lnSpc>
-                <a:spcPct val="150000"/>
-              </a:lnSpc>
-            </a:pPr>
-            <a:r>
-              <a:rPr lang="en-US" dirty="0"/>
-              <a:t>Email: </a:t>
-            </a:r>
-            <a:r>
-              <a:rPr lang="en-US" dirty="0">
-                <a:hlinkClick r:id="rId2"/>
-              </a:rPr>
-              <a:t>liwen.li.1@unimelb.edu.au</a:t>
-            </a:r>
-            <a:endParaRPr lang="en-US" dirty="0"/>
-          </a:p>
-          <a:p>
-            <a:pPr marL="285750" indent="-285750">
-              <a:lnSpc>
-                <a:spcPct val="150000"/>
-              </a:lnSpc>
-            </a:pPr>
-            <a:r>
-              <a:rPr lang="en-US" dirty="0"/>
-              <a:t>Master of Science (Bioinformatics)</a:t>
-            </a:r>
           </a:p>
         </p:txBody>
       </p:sp>
     </p:spTree>
     <p:extLst>
       <p:ext uri="{BB962C8B-B14F-4D97-AF65-F5344CB8AC3E}">
-        <p14:creationId xmlns:p14="http://schemas.microsoft.com/office/powerpoint/2010/main" val="2855224905"/>
+        <p14:creationId xmlns:p14="http://schemas.microsoft.com/office/powerpoint/2010/main" val="4248554318"/>
       </p:ext>
     </p:extLst>
   </p:cSld>
@@ -5037,7 +5043,7 @@
         </p:blipFill>
         <p:spPr bwMode="auto">
           <a:xfrm>
-            <a:off x="1745440" y="1564313"/>
+            <a:off x="1256343" y="1638741"/>
             <a:ext cx="5653119" cy="4797932"/>
           </a:xfrm>
           <a:prstGeom prst="rect">
@@ -5117,6 +5123,1947 @@
   <p:clrMapOvr>
     <a:masterClrMapping/>
   </p:clrMapOvr>
+</p:sld>
+</file>
+
+<file path=ppt/slides/slide7.xml><?xml version="1.0" encoding="utf-8"?>
+<p:sld xmlns:a="http://schemas.openxmlformats.org/drawingml/2006/main" xmlns:r="http://schemas.openxmlformats.org/officeDocument/2006/relationships" xmlns:p="http://schemas.openxmlformats.org/presentationml/2006/main">
+  <p:cSld>
+    <p:spTree>
+      <p:nvGrpSpPr>
+        <p:cNvPr id="1" name="">
+          <a:extLst>
+            <a:ext uri="{FF2B5EF4-FFF2-40B4-BE49-F238E27FC236}">
+              <a16:creationId xmlns:a16="http://schemas.microsoft.com/office/drawing/2014/main" id="{240EC1FE-96F8-1311-BAAC-C1770BC9AE50}"/>
+            </a:ext>
+          </a:extLst>
+        </p:cNvPr>
+        <p:cNvGrpSpPr/>
+        <p:nvPr/>
+      </p:nvGrpSpPr>
+      <p:grpSpPr>
+        <a:xfrm>
+          <a:off x="0" y="0"/>
+          <a:ext cx="0" cy="0"/>
+          <a:chOff x="0" y="0"/>
+          <a:chExt cx="0" cy="0"/>
+        </a:xfrm>
+      </p:grpSpPr>
+      <p:sp>
+        <p:nvSpPr>
+          <p:cNvPr id="4" name="Title 1">
+            <a:extLst>
+              <a:ext uri="{FF2B5EF4-FFF2-40B4-BE49-F238E27FC236}">
+                <a16:creationId xmlns:a16="http://schemas.microsoft.com/office/drawing/2014/main" id="{BA26729A-6BD7-15DF-0A18-36078EE90C11}"/>
+              </a:ext>
+            </a:extLst>
+          </p:cNvPr>
+          <p:cNvSpPr txBox="1">
+            <a:spLocks/>
+          </p:cNvSpPr>
+          <p:nvPr/>
+        </p:nvSpPr>
+        <p:spPr>
+          <a:xfrm>
+            <a:off x="306977" y="495755"/>
+            <a:ext cx="8530046" cy="900000"/>
+          </a:xfrm>
+          <a:prstGeom prst="rect">
+            <a:avLst/>
+          </a:prstGeom>
+        </p:spPr>
+        <p:txBody>
+          <a:bodyPr vert="horz" lIns="91440" tIns="45720" rIns="91440" bIns="45720" rtlCol="0" anchor="ctr">
+            <a:normAutofit/>
+          </a:bodyPr>
+          <a:lstStyle>
+            <a:lvl1pPr algn="l" defTabSz="914400" rtl="0" eaLnBrk="1" latinLnBrk="0" hangingPunct="1">
+              <a:lnSpc>
+                <a:spcPct val="90000"/>
+              </a:lnSpc>
+              <a:spcBef>
+                <a:spcPct val="0"/>
+              </a:spcBef>
+              <a:buNone/>
+              <a:defRPr sz="4400" kern="1200">
+                <a:solidFill>
+                  <a:schemeClr val="tx1"/>
+                </a:solidFill>
+                <a:latin typeface="+mj-lt"/>
+                <a:ea typeface="+mj-ea"/>
+                <a:cs typeface="+mj-cs"/>
+              </a:defRPr>
+            </a:lvl1pPr>
+          </a:lstStyle>
+          <a:p>
+            <a:pPr algn="ctr"/>
+            <a:r>
+              <a:rPr lang="en-AU" dirty="0">
+                <a:solidFill>
+                  <a:srgbClr val="FF0000"/>
+                </a:solidFill>
+              </a:rPr>
+              <a:t>Merge</a:t>
+            </a:r>
+          </a:p>
+        </p:txBody>
+      </p:sp>
+      <p:graphicFrame>
+        <p:nvGraphicFramePr>
+          <p:cNvPr id="5" name="表格 4">
+            <a:extLst>
+              <a:ext uri="{FF2B5EF4-FFF2-40B4-BE49-F238E27FC236}">
+                <a16:creationId xmlns:a16="http://schemas.microsoft.com/office/drawing/2014/main" id="{E9CB3824-3645-1272-1008-1B22FA3B7231}"/>
+              </a:ext>
+            </a:extLst>
+          </p:cNvPr>
+          <p:cNvGraphicFramePr>
+            <a:graphicFrameLocks noGrp="1"/>
+          </p:cNvGraphicFramePr>
+          <p:nvPr>
+            <p:extLst>
+              <p:ext uri="{D42A27DB-BD31-4B8C-83A1-F6EECF244321}">
+                <p14:modId xmlns:p14="http://schemas.microsoft.com/office/powerpoint/2010/main" val="2937045482"/>
+              </p:ext>
+            </p:extLst>
+          </p:nvPr>
+        </p:nvGraphicFramePr>
+        <p:xfrm>
+          <a:off x="360556" y="1971158"/>
+          <a:ext cx="3414004" cy="370840"/>
+        </p:xfrm>
+        <a:graphic>
+          <a:graphicData uri="http://schemas.openxmlformats.org/drawingml/2006/table">
+            <a:tbl>
+              <a:tblPr firstRow="1" bandRow="1">
+                <a:tableStyleId>{5C22544A-7EE6-4342-B048-85BDC9FD1C3A}</a:tableStyleId>
+              </a:tblPr>
+              <a:tblGrid>
+                <a:gridCol w="853501">
+                  <a:extLst>
+                    <a:ext uri="{9D8B030D-6E8A-4147-A177-3AD203B41FA5}">
+                      <a16:colId xmlns:a16="http://schemas.microsoft.com/office/drawing/2014/main" val="2869292046"/>
+                    </a:ext>
+                  </a:extLst>
+                </a:gridCol>
+                <a:gridCol w="853501">
+                  <a:extLst>
+                    <a:ext uri="{9D8B030D-6E8A-4147-A177-3AD203B41FA5}">
+                      <a16:colId xmlns:a16="http://schemas.microsoft.com/office/drawing/2014/main" val="332181942"/>
+                    </a:ext>
+                  </a:extLst>
+                </a:gridCol>
+                <a:gridCol w="853501">
+                  <a:extLst>
+                    <a:ext uri="{9D8B030D-6E8A-4147-A177-3AD203B41FA5}">
+                      <a16:colId xmlns:a16="http://schemas.microsoft.com/office/drawing/2014/main" val="1348083431"/>
+                    </a:ext>
+                  </a:extLst>
+                </a:gridCol>
+                <a:gridCol w="853501">
+                  <a:extLst>
+                    <a:ext uri="{9D8B030D-6E8A-4147-A177-3AD203B41FA5}">
+                      <a16:colId xmlns:a16="http://schemas.microsoft.com/office/drawing/2014/main" val="1450222351"/>
+                    </a:ext>
+                  </a:extLst>
+                </a:gridCol>
+              </a:tblGrid>
+              <a:tr h="370840">
+                <a:tc>
+                  <a:txBody>
+                    <a:bodyPr/>
+                    <a:lstStyle/>
+                    <a:p>
+                      <a:pPr algn="ctr"/>
+                      <a:r>
+                        <a:rPr lang="en-US" altLang="zh-CN" dirty="0"/>
+                        <a:t>2</a:t>
+                      </a:r>
+                      <a:endParaRPr lang="zh-CN" altLang="en-US" dirty="0"/>
+                    </a:p>
+                  </a:txBody>
+                  <a:tcPr/>
+                </a:tc>
+                <a:tc>
+                  <a:txBody>
+                    <a:bodyPr/>
+                    <a:lstStyle/>
+                    <a:p>
+                      <a:pPr algn="ctr"/>
+                      <a:r>
+                        <a:rPr lang="en-US" altLang="zh-CN" dirty="0"/>
+                        <a:t>4</a:t>
+                      </a:r>
+                      <a:endParaRPr lang="zh-CN" altLang="en-US" dirty="0"/>
+                    </a:p>
+                  </a:txBody>
+                  <a:tcPr/>
+                </a:tc>
+                <a:tc>
+                  <a:txBody>
+                    <a:bodyPr/>
+                    <a:lstStyle/>
+                    <a:p>
+                      <a:pPr algn="ctr"/>
+                      <a:r>
+                        <a:rPr lang="en-US" altLang="zh-CN" dirty="0"/>
+                        <a:t>5</a:t>
+                      </a:r>
+                      <a:endParaRPr lang="zh-CN" altLang="en-US" dirty="0"/>
+                    </a:p>
+                  </a:txBody>
+                  <a:tcPr/>
+                </a:tc>
+                <a:tc>
+                  <a:txBody>
+                    <a:bodyPr/>
+                    <a:lstStyle/>
+                    <a:p>
+                      <a:pPr algn="ctr"/>
+                      <a:r>
+                        <a:rPr lang="en-US" altLang="zh-CN" dirty="0"/>
+                        <a:t>7</a:t>
+                      </a:r>
+                      <a:endParaRPr lang="zh-CN" altLang="en-US" dirty="0"/>
+                    </a:p>
+                  </a:txBody>
+                  <a:tcPr/>
+                </a:tc>
+                <a:extLst>
+                  <a:ext uri="{0D108BD9-81ED-4DB2-BD59-A6C34878D82A}">
+                    <a16:rowId xmlns:a16="http://schemas.microsoft.com/office/drawing/2014/main" val="996236466"/>
+                  </a:ext>
+                </a:extLst>
+              </a:tr>
+            </a:tbl>
+          </a:graphicData>
+        </a:graphic>
+      </p:graphicFrame>
+      <p:graphicFrame>
+        <p:nvGraphicFramePr>
+          <p:cNvPr id="6" name="表格 5">
+            <a:extLst>
+              <a:ext uri="{FF2B5EF4-FFF2-40B4-BE49-F238E27FC236}">
+                <a16:creationId xmlns:a16="http://schemas.microsoft.com/office/drawing/2014/main" id="{5584AA71-B0B0-8663-946A-675C1A25FE6B}"/>
+              </a:ext>
+            </a:extLst>
+          </p:cNvPr>
+          <p:cNvGraphicFramePr>
+            <a:graphicFrameLocks noGrp="1"/>
+          </p:cNvGraphicFramePr>
+          <p:nvPr>
+            <p:extLst>
+              <p:ext uri="{D42A27DB-BD31-4B8C-83A1-F6EECF244321}">
+                <p14:modId xmlns:p14="http://schemas.microsoft.com/office/powerpoint/2010/main" val="1937707448"/>
+              </p:ext>
+            </p:extLst>
+          </p:nvPr>
+        </p:nvGraphicFramePr>
+        <p:xfrm>
+          <a:off x="4845185" y="1971158"/>
+          <a:ext cx="3467580" cy="370840"/>
+        </p:xfrm>
+        <a:graphic>
+          <a:graphicData uri="http://schemas.openxmlformats.org/drawingml/2006/table">
+            <a:tbl>
+              <a:tblPr firstRow="1" bandRow="1">
+                <a:tableStyleId>{5C22544A-7EE6-4342-B048-85BDC9FD1C3A}</a:tableStyleId>
+              </a:tblPr>
+              <a:tblGrid>
+                <a:gridCol w="866895">
+                  <a:extLst>
+                    <a:ext uri="{9D8B030D-6E8A-4147-A177-3AD203B41FA5}">
+                      <a16:colId xmlns:a16="http://schemas.microsoft.com/office/drawing/2014/main" val="2869292046"/>
+                    </a:ext>
+                  </a:extLst>
+                </a:gridCol>
+                <a:gridCol w="866895">
+                  <a:extLst>
+                    <a:ext uri="{9D8B030D-6E8A-4147-A177-3AD203B41FA5}">
+                      <a16:colId xmlns:a16="http://schemas.microsoft.com/office/drawing/2014/main" val="332181942"/>
+                    </a:ext>
+                  </a:extLst>
+                </a:gridCol>
+                <a:gridCol w="866895">
+                  <a:extLst>
+                    <a:ext uri="{9D8B030D-6E8A-4147-A177-3AD203B41FA5}">
+                      <a16:colId xmlns:a16="http://schemas.microsoft.com/office/drawing/2014/main" val="1348083431"/>
+                    </a:ext>
+                  </a:extLst>
+                </a:gridCol>
+                <a:gridCol w="866895">
+                  <a:extLst>
+                    <a:ext uri="{9D8B030D-6E8A-4147-A177-3AD203B41FA5}">
+                      <a16:colId xmlns:a16="http://schemas.microsoft.com/office/drawing/2014/main" val="1450222351"/>
+                    </a:ext>
+                  </a:extLst>
+                </a:gridCol>
+              </a:tblGrid>
+              <a:tr h="370840">
+                <a:tc>
+                  <a:txBody>
+                    <a:bodyPr/>
+                    <a:lstStyle/>
+                    <a:p>
+                      <a:pPr algn="ctr"/>
+                      <a:r>
+                        <a:rPr lang="en-US" altLang="zh-CN" dirty="0"/>
+                        <a:t>1</a:t>
+                      </a:r>
+                      <a:endParaRPr lang="zh-CN" altLang="en-US" dirty="0"/>
+                    </a:p>
+                  </a:txBody>
+                  <a:tcPr/>
+                </a:tc>
+                <a:tc>
+                  <a:txBody>
+                    <a:bodyPr/>
+                    <a:lstStyle/>
+                    <a:p>
+                      <a:pPr algn="ctr"/>
+                      <a:r>
+                        <a:rPr lang="en-US" altLang="zh-CN" dirty="0"/>
+                        <a:t>2</a:t>
+                      </a:r>
+                      <a:endParaRPr lang="zh-CN" altLang="en-US" dirty="0"/>
+                    </a:p>
+                  </a:txBody>
+                  <a:tcPr/>
+                </a:tc>
+                <a:tc>
+                  <a:txBody>
+                    <a:bodyPr/>
+                    <a:lstStyle/>
+                    <a:p>
+                      <a:pPr algn="ctr"/>
+                      <a:r>
+                        <a:rPr lang="en-US" altLang="zh-CN" dirty="0"/>
+                        <a:t>3</a:t>
+                      </a:r>
+                      <a:endParaRPr lang="zh-CN" altLang="en-US" dirty="0"/>
+                    </a:p>
+                  </a:txBody>
+                  <a:tcPr/>
+                </a:tc>
+                <a:tc>
+                  <a:txBody>
+                    <a:bodyPr/>
+                    <a:lstStyle/>
+                    <a:p>
+                      <a:pPr algn="ctr"/>
+                      <a:r>
+                        <a:rPr lang="en-US" altLang="zh-CN" dirty="0"/>
+                        <a:t>6</a:t>
+                      </a:r>
+                      <a:endParaRPr lang="zh-CN" altLang="en-US" dirty="0"/>
+                    </a:p>
+                  </a:txBody>
+                  <a:tcPr/>
+                </a:tc>
+                <a:extLst>
+                  <a:ext uri="{0D108BD9-81ED-4DB2-BD59-A6C34878D82A}">
+                    <a16:rowId xmlns:a16="http://schemas.microsoft.com/office/drawing/2014/main" val="996236466"/>
+                  </a:ext>
+                </a:extLst>
+              </a:tr>
+            </a:tbl>
+          </a:graphicData>
+        </a:graphic>
+      </p:graphicFrame>
+      <p:sp>
+        <p:nvSpPr>
+          <p:cNvPr id="7" name="文本框 6">
+            <a:extLst>
+              <a:ext uri="{FF2B5EF4-FFF2-40B4-BE49-F238E27FC236}">
+                <a16:creationId xmlns:a16="http://schemas.microsoft.com/office/drawing/2014/main" id="{AF1AFF61-C318-B2EC-2448-9221F6BA955E}"/>
+              </a:ext>
+            </a:extLst>
+          </p:cNvPr>
+          <p:cNvSpPr txBox="1"/>
+          <p:nvPr/>
+        </p:nvSpPr>
+        <p:spPr>
+          <a:xfrm>
+            <a:off x="701748" y="2341998"/>
+            <a:ext cx="237566" cy="369332"/>
+          </a:xfrm>
+          <a:prstGeom prst="rect">
+            <a:avLst/>
+          </a:prstGeom>
+          <a:noFill/>
+        </p:spPr>
+        <p:txBody>
+          <a:bodyPr wrap="none" rtlCol="0">
+            <a:spAutoFit/>
+          </a:bodyPr>
+          <a:lstStyle/>
+          <a:p>
+            <a:r>
+              <a:rPr kumimoji="1" lang="en-US" altLang="zh-CN" dirty="0" err="1">
+                <a:solidFill>
+                  <a:srgbClr val="FF0000"/>
+                </a:solidFill>
+              </a:rPr>
+              <a:t>i</a:t>
+            </a:r>
+            <a:endParaRPr kumimoji="1" lang="zh-CN" altLang="en-US" dirty="0">
+              <a:solidFill>
+                <a:srgbClr val="FF0000"/>
+              </a:solidFill>
+            </a:endParaRPr>
+          </a:p>
+        </p:txBody>
+      </p:sp>
+      <p:sp>
+        <p:nvSpPr>
+          <p:cNvPr id="9" name="文本框 8">
+            <a:extLst>
+              <a:ext uri="{FF2B5EF4-FFF2-40B4-BE49-F238E27FC236}">
+                <a16:creationId xmlns:a16="http://schemas.microsoft.com/office/drawing/2014/main" id="{CCC270F6-E9C4-8870-AA7C-1DC3D0302A9D}"/>
+              </a:ext>
+            </a:extLst>
+          </p:cNvPr>
+          <p:cNvSpPr txBox="1"/>
+          <p:nvPr/>
+        </p:nvSpPr>
+        <p:spPr>
+          <a:xfrm>
+            <a:off x="5199553" y="2341998"/>
+            <a:ext cx="265814" cy="369332"/>
+          </a:xfrm>
+          <a:prstGeom prst="rect">
+            <a:avLst/>
+          </a:prstGeom>
+          <a:noFill/>
+        </p:spPr>
+        <p:txBody>
+          <a:bodyPr wrap="square">
+            <a:spAutoFit/>
+          </a:bodyPr>
+          <a:lstStyle/>
+          <a:p>
+            <a:r>
+              <a:rPr kumimoji="1" lang="en-US" altLang="zh-CN" dirty="0">
+                <a:solidFill>
+                  <a:srgbClr val="FF0000"/>
+                </a:solidFill>
+              </a:rPr>
+              <a:t>j</a:t>
+            </a:r>
+            <a:endParaRPr kumimoji="1" lang="zh-CN" altLang="en-US" dirty="0">
+              <a:solidFill>
+                <a:srgbClr val="FF0000"/>
+              </a:solidFill>
+            </a:endParaRPr>
+          </a:p>
+        </p:txBody>
+      </p:sp>
+      <p:graphicFrame>
+        <p:nvGraphicFramePr>
+          <p:cNvPr id="10" name="表格 9">
+            <a:extLst>
+              <a:ext uri="{FF2B5EF4-FFF2-40B4-BE49-F238E27FC236}">
+                <a16:creationId xmlns:a16="http://schemas.microsoft.com/office/drawing/2014/main" id="{0291B5CD-8984-DB49-02AB-C1684CF9BEAC}"/>
+              </a:ext>
+            </a:extLst>
+          </p:cNvPr>
+          <p:cNvGraphicFramePr>
+            <a:graphicFrameLocks noGrp="1"/>
+          </p:cNvGraphicFramePr>
+          <p:nvPr>
+            <p:extLst>
+              <p:ext uri="{D42A27DB-BD31-4B8C-83A1-F6EECF244321}">
+                <p14:modId xmlns:p14="http://schemas.microsoft.com/office/powerpoint/2010/main" val="3472811827"/>
+              </p:ext>
+            </p:extLst>
+          </p:nvPr>
+        </p:nvGraphicFramePr>
+        <p:xfrm>
+          <a:off x="1524000" y="4330583"/>
+          <a:ext cx="6096000" cy="370840"/>
+        </p:xfrm>
+        <a:graphic>
+          <a:graphicData uri="http://schemas.openxmlformats.org/drawingml/2006/table">
+            <a:tbl>
+              <a:tblPr firstRow="1" bandRow="1">
+                <a:tableStyleId>{5C22544A-7EE6-4342-B048-85BDC9FD1C3A}</a:tableStyleId>
+              </a:tblPr>
+              <a:tblGrid>
+                <a:gridCol w="762000">
+                  <a:extLst>
+                    <a:ext uri="{9D8B030D-6E8A-4147-A177-3AD203B41FA5}">
+                      <a16:colId xmlns:a16="http://schemas.microsoft.com/office/drawing/2014/main" val="558796012"/>
+                    </a:ext>
+                  </a:extLst>
+                </a:gridCol>
+                <a:gridCol w="762000">
+                  <a:extLst>
+                    <a:ext uri="{9D8B030D-6E8A-4147-A177-3AD203B41FA5}">
+                      <a16:colId xmlns:a16="http://schemas.microsoft.com/office/drawing/2014/main" val="1786859185"/>
+                    </a:ext>
+                  </a:extLst>
+                </a:gridCol>
+                <a:gridCol w="762000">
+                  <a:extLst>
+                    <a:ext uri="{9D8B030D-6E8A-4147-A177-3AD203B41FA5}">
+                      <a16:colId xmlns:a16="http://schemas.microsoft.com/office/drawing/2014/main" val="1107742889"/>
+                    </a:ext>
+                  </a:extLst>
+                </a:gridCol>
+                <a:gridCol w="762000">
+                  <a:extLst>
+                    <a:ext uri="{9D8B030D-6E8A-4147-A177-3AD203B41FA5}">
+                      <a16:colId xmlns:a16="http://schemas.microsoft.com/office/drawing/2014/main" val="2243639934"/>
+                    </a:ext>
+                  </a:extLst>
+                </a:gridCol>
+                <a:gridCol w="762000">
+                  <a:extLst>
+                    <a:ext uri="{9D8B030D-6E8A-4147-A177-3AD203B41FA5}">
+                      <a16:colId xmlns:a16="http://schemas.microsoft.com/office/drawing/2014/main" val="4219723739"/>
+                    </a:ext>
+                  </a:extLst>
+                </a:gridCol>
+                <a:gridCol w="762000">
+                  <a:extLst>
+                    <a:ext uri="{9D8B030D-6E8A-4147-A177-3AD203B41FA5}">
+                      <a16:colId xmlns:a16="http://schemas.microsoft.com/office/drawing/2014/main" val="3566798995"/>
+                    </a:ext>
+                  </a:extLst>
+                </a:gridCol>
+                <a:gridCol w="762000">
+                  <a:extLst>
+                    <a:ext uri="{9D8B030D-6E8A-4147-A177-3AD203B41FA5}">
+                      <a16:colId xmlns:a16="http://schemas.microsoft.com/office/drawing/2014/main" val="3823161053"/>
+                    </a:ext>
+                  </a:extLst>
+                </a:gridCol>
+                <a:gridCol w="762000">
+                  <a:extLst>
+                    <a:ext uri="{9D8B030D-6E8A-4147-A177-3AD203B41FA5}">
+                      <a16:colId xmlns:a16="http://schemas.microsoft.com/office/drawing/2014/main" val="2454541828"/>
+                    </a:ext>
+                  </a:extLst>
+                </a:gridCol>
+              </a:tblGrid>
+              <a:tr h="370840">
+                <a:tc>
+                  <a:txBody>
+                    <a:bodyPr/>
+                    <a:lstStyle/>
+                    <a:p>
+                      <a:pPr algn="ctr"/>
+                      <a:endParaRPr lang="zh-CN" altLang="en-US" dirty="0"/>
+                    </a:p>
+                  </a:txBody>
+                  <a:tcPr/>
+                </a:tc>
+                <a:tc>
+                  <a:txBody>
+                    <a:bodyPr/>
+                    <a:lstStyle/>
+                    <a:p>
+                      <a:pPr algn="ctr"/>
+                      <a:endParaRPr lang="zh-CN" altLang="en-US" dirty="0"/>
+                    </a:p>
+                  </a:txBody>
+                  <a:tcPr/>
+                </a:tc>
+                <a:tc>
+                  <a:txBody>
+                    <a:bodyPr/>
+                    <a:lstStyle/>
+                    <a:p>
+                      <a:pPr algn="ctr"/>
+                      <a:endParaRPr lang="zh-CN" altLang="en-US" dirty="0"/>
+                    </a:p>
+                  </a:txBody>
+                  <a:tcPr/>
+                </a:tc>
+                <a:tc>
+                  <a:txBody>
+                    <a:bodyPr/>
+                    <a:lstStyle/>
+                    <a:p>
+                      <a:pPr algn="ctr"/>
+                      <a:endParaRPr lang="zh-CN" altLang="en-US" dirty="0"/>
+                    </a:p>
+                  </a:txBody>
+                  <a:tcPr/>
+                </a:tc>
+                <a:tc>
+                  <a:txBody>
+                    <a:bodyPr/>
+                    <a:lstStyle/>
+                    <a:p>
+                      <a:pPr algn="ctr"/>
+                      <a:endParaRPr lang="zh-CN" altLang="en-US" dirty="0"/>
+                    </a:p>
+                  </a:txBody>
+                  <a:tcPr/>
+                </a:tc>
+                <a:tc>
+                  <a:txBody>
+                    <a:bodyPr/>
+                    <a:lstStyle/>
+                    <a:p>
+                      <a:pPr algn="ctr"/>
+                      <a:endParaRPr lang="zh-CN" altLang="en-US" dirty="0"/>
+                    </a:p>
+                  </a:txBody>
+                  <a:tcPr/>
+                </a:tc>
+                <a:tc>
+                  <a:txBody>
+                    <a:bodyPr/>
+                    <a:lstStyle/>
+                    <a:p>
+                      <a:pPr algn="ctr"/>
+                      <a:endParaRPr lang="zh-CN" altLang="en-US" dirty="0"/>
+                    </a:p>
+                  </a:txBody>
+                  <a:tcPr/>
+                </a:tc>
+                <a:tc>
+                  <a:txBody>
+                    <a:bodyPr/>
+                    <a:lstStyle/>
+                    <a:p>
+                      <a:pPr algn="ctr"/>
+                      <a:endParaRPr lang="zh-CN" altLang="en-US" dirty="0"/>
+                    </a:p>
+                  </a:txBody>
+                  <a:tcPr/>
+                </a:tc>
+                <a:extLst>
+                  <a:ext uri="{0D108BD9-81ED-4DB2-BD59-A6C34878D82A}">
+                    <a16:rowId xmlns:a16="http://schemas.microsoft.com/office/drawing/2014/main" val="3615118572"/>
+                  </a:ext>
+                </a:extLst>
+              </a:tr>
+            </a:tbl>
+          </a:graphicData>
+        </a:graphic>
+      </p:graphicFrame>
+      <p:sp>
+        <p:nvSpPr>
+          <p:cNvPr id="11" name="文本框 10">
+            <a:extLst>
+              <a:ext uri="{FF2B5EF4-FFF2-40B4-BE49-F238E27FC236}">
+                <a16:creationId xmlns:a16="http://schemas.microsoft.com/office/drawing/2014/main" id="{703775F5-7D72-840C-0B35-E4540C50FB26}"/>
+              </a:ext>
+            </a:extLst>
+          </p:cNvPr>
+          <p:cNvSpPr txBox="1"/>
+          <p:nvPr/>
+        </p:nvSpPr>
+        <p:spPr>
+          <a:xfrm>
+            <a:off x="1660074" y="4701423"/>
+            <a:ext cx="513282" cy="369332"/>
+          </a:xfrm>
+          <a:prstGeom prst="rect">
+            <a:avLst/>
+          </a:prstGeom>
+          <a:noFill/>
+        </p:spPr>
+        <p:txBody>
+          <a:bodyPr wrap="none" rtlCol="0">
+            <a:spAutoFit/>
+          </a:bodyPr>
+          <a:lstStyle/>
+          <a:p>
+            <a:r>
+              <a:rPr kumimoji="1" lang="en-US" altLang="zh-CN" dirty="0">
+                <a:solidFill>
+                  <a:srgbClr val="FF0000"/>
+                </a:solidFill>
+              </a:rPr>
+              <a:t>i + j</a:t>
+            </a:r>
+            <a:endParaRPr kumimoji="1" lang="zh-CN" altLang="en-US" dirty="0">
+              <a:solidFill>
+                <a:srgbClr val="FF0000"/>
+              </a:solidFill>
+            </a:endParaRPr>
+          </a:p>
+        </p:txBody>
+      </p:sp>
+      <p:sp>
+        <p:nvSpPr>
+          <p:cNvPr id="13" name="文本框 12">
+            <a:extLst>
+              <a:ext uri="{FF2B5EF4-FFF2-40B4-BE49-F238E27FC236}">
+                <a16:creationId xmlns:a16="http://schemas.microsoft.com/office/drawing/2014/main" id="{18A4D9D4-56D4-403F-097F-002AB4C24922}"/>
+              </a:ext>
+            </a:extLst>
+          </p:cNvPr>
+          <p:cNvSpPr txBox="1"/>
+          <p:nvPr/>
+        </p:nvSpPr>
+        <p:spPr>
+          <a:xfrm>
+            <a:off x="1765872" y="4330583"/>
+            <a:ext cx="301686" cy="369332"/>
+          </a:xfrm>
+          <a:prstGeom prst="rect">
+            <a:avLst/>
+          </a:prstGeom>
+          <a:noFill/>
+        </p:spPr>
+        <p:txBody>
+          <a:bodyPr wrap="none" rtlCol="0">
+            <a:spAutoFit/>
+          </a:bodyPr>
+          <a:lstStyle/>
+          <a:p>
+            <a:r>
+              <a:rPr kumimoji="1" lang="en-US" altLang="zh-CN" b="1" dirty="0">
+                <a:solidFill>
+                  <a:schemeClr val="bg1"/>
+                </a:solidFill>
+              </a:rPr>
+              <a:t>1</a:t>
+            </a:r>
+            <a:endParaRPr kumimoji="1" lang="zh-CN" altLang="en-US" b="1" dirty="0">
+              <a:solidFill>
+                <a:schemeClr val="bg1"/>
+              </a:solidFill>
+            </a:endParaRPr>
+          </a:p>
+        </p:txBody>
+      </p:sp>
+      <p:sp>
+        <p:nvSpPr>
+          <p:cNvPr id="14" name="文本框 13">
+            <a:extLst>
+              <a:ext uri="{FF2B5EF4-FFF2-40B4-BE49-F238E27FC236}">
+                <a16:creationId xmlns:a16="http://schemas.microsoft.com/office/drawing/2014/main" id="{6B19B9C3-DE6A-9A56-673C-4BF689D1E04A}"/>
+              </a:ext>
+            </a:extLst>
+          </p:cNvPr>
+          <p:cNvSpPr txBox="1"/>
+          <p:nvPr/>
+        </p:nvSpPr>
+        <p:spPr>
+          <a:xfrm>
+            <a:off x="2522616" y="4330583"/>
+            <a:ext cx="301686" cy="369332"/>
+          </a:xfrm>
+          <a:prstGeom prst="rect">
+            <a:avLst/>
+          </a:prstGeom>
+          <a:noFill/>
+        </p:spPr>
+        <p:txBody>
+          <a:bodyPr wrap="square" rtlCol="0">
+            <a:spAutoFit/>
+          </a:bodyPr>
+          <a:lstStyle/>
+          <a:p>
+            <a:r>
+              <a:rPr kumimoji="1" lang="en-US" altLang="zh-CN" b="1" dirty="0">
+                <a:solidFill>
+                  <a:schemeClr val="bg1"/>
+                </a:solidFill>
+              </a:rPr>
+              <a:t>2</a:t>
+            </a:r>
+            <a:endParaRPr kumimoji="1" lang="zh-CN" altLang="en-US" b="1" dirty="0">
+              <a:solidFill>
+                <a:schemeClr val="bg1"/>
+              </a:solidFill>
+            </a:endParaRPr>
+          </a:p>
+        </p:txBody>
+      </p:sp>
+      <p:sp>
+        <p:nvSpPr>
+          <p:cNvPr id="15" name="文本框 14">
+            <a:extLst>
+              <a:ext uri="{FF2B5EF4-FFF2-40B4-BE49-F238E27FC236}">
+                <a16:creationId xmlns:a16="http://schemas.microsoft.com/office/drawing/2014/main" id="{971AEC0F-E8D0-B5D9-6BAB-27B13880808D}"/>
+              </a:ext>
+            </a:extLst>
+          </p:cNvPr>
+          <p:cNvSpPr txBox="1"/>
+          <p:nvPr/>
+        </p:nvSpPr>
+        <p:spPr>
+          <a:xfrm>
+            <a:off x="3279361" y="4330583"/>
+            <a:ext cx="301686" cy="369332"/>
+          </a:xfrm>
+          <a:prstGeom prst="rect">
+            <a:avLst/>
+          </a:prstGeom>
+          <a:noFill/>
+        </p:spPr>
+        <p:txBody>
+          <a:bodyPr wrap="square" rtlCol="0">
+            <a:spAutoFit/>
+          </a:bodyPr>
+          <a:lstStyle/>
+          <a:p>
+            <a:r>
+              <a:rPr kumimoji="1" lang="en-US" altLang="zh-CN" b="1" dirty="0">
+                <a:solidFill>
+                  <a:schemeClr val="bg1"/>
+                </a:solidFill>
+              </a:rPr>
+              <a:t>2</a:t>
+            </a:r>
+            <a:endParaRPr kumimoji="1" lang="zh-CN" altLang="en-US" b="1" dirty="0">
+              <a:solidFill>
+                <a:schemeClr val="bg1"/>
+              </a:solidFill>
+            </a:endParaRPr>
+          </a:p>
+        </p:txBody>
+      </p:sp>
+      <p:sp>
+        <p:nvSpPr>
+          <p:cNvPr id="16" name="文本框 15">
+            <a:extLst>
+              <a:ext uri="{FF2B5EF4-FFF2-40B4-BE49-F238E27FC236}">
+                <a16:creationId xmlns:a16="http://schemas.microsoft.com/office/drawing/2014/main" id="{84B5C758-45B2-FF66-F076-000EC29E28A6}"/>
+              </a:ext>
+            </a:extLst>
+          </p:cNvPr>
+          <p:cNvSpPr txBox="1"/>
+          <p:nvPr/>
+        </p:nvSpPr>
+        <p:spPr>
+          <a:xfrm>
+            <a:off x="4030476" y="4330583"/>
+            <a:ext cx="301686" cy="369332"/>
+          </a:xfrm>
+          <a:prstGeom prst="rect">
+            <a:avLst/>
+          </a:prstGeom>
+          <a:noFill/>
+        </p:spPr>
+        <p:txBody>
+          <a:bodyPr wrap="square" rtlCol="0">
+            <a:spAutoFit/>
+          </a:bodyPr>
+          <a:lstStyle/>
+          <a:p>
+            <a:r>
+              <a:rPr kumimoji="1" lang="en-US" altLang="zh-CN" b="1" dirty="0">
+                <a:solidFill>
+                  <a:schemeClr val="bg1"/>
+                </a:solidFill>
+              </a:rPr>
+              <a:t>3</a:t>
+            </a:r>
+            <a:endParaRPr kumimoji="1" lang="zh-CN" altLang="en-US" b="1" dirty="0">
+              <a:solidFill>
+                <a:schemeClr val="bg1"/>
+              </a:solidFill>
+            </a:endParaRPr>
+          </a:p>
+        </p:txBody>
+      </p:sp>
+      <p:sp>
+        <p:nvSpPr>
+          <p:cNvPr id="17" name="文本框 16">
+            <a:extLst>
+              <a:ext uri="{FF2B5EF4-FFF2-40B4-BE49-F238E27FC236}">
+                <a16:creationId xmlns:a16="http://schemas.microsoft.com/office/drawing/2014/main" id="{7C40BA0F-CE85-C2C9-4830-683266E3B808}"/>
+              </a:ext>
+            </a:extLst>
+          </p:cNvPr>
+          <p:cNvSpPr txBox="1"/>
+          <p:nvPr/>
+        </p:nvSpPr>
+        <p:spPr>
+          <a:xfrm>
+            <a:off x="5543145" y="4330583"/>
+            <a:ext cx="301686" cy="369332"/>
+          </a:xfrm>
+          <a:prstGeom prst="rect">
+            <a:avLst/>
+          </a:prstGeom>
+          <a:noFill/>
+        </p:spPr>
+        <p:txBody>
+          <a:bodyPr wrap="square" rtlCol="0">
+            <a:spAutoFit/>
+          </a:bodyPr>
+          <a:lstStyle/>
+          <a:p>
+            <a:r>
+              <a:rPr kumimoji="1" lang="en-US" altLang="zh-CN" b="1" dirty="0">
+                <a:solidFill>
+                  <a:schemeClr val="bg1"/>
+                </a:solidFill>
+              </a:rPr>
+              <a:t>5</a:t>
+            </a:r>
+            <a:endParaRPr kumimoji="1" lang="zh-CN" altLang="en-US" b="1" dirty="0">
+              <a:solidFill>
+                <a:schemeClr val="bg1"/>
+              </a:solidFill>
+            </a:endParaRPr>
+          </a:p>
+        </p:txBody>
+      </p:sp>
+      <p:sp>
+        <p:nvSpPr>
+          <p:cNvPr id="18" name="文本框 17">
+            <a:extLst>
+              <a:ext uri="{FF2B5EF4-FFF2-40B4-BE49-F238E27FC236}">
+                <a16:creationId xmlns:a16="http://schemas.microsoft.com/office/drawing/2014/main" id="{9F648345-71A0-3B14-1B25-43937E0ACA66}"/>
+              </a:ext>
+            </a:extLst>
+          </p:cNvPr>
+          <p:cNvSpPr txBox="1"/>
+          <p:nvPr/>
+        </p:nvSpPr>
+        <p:spPr>
+          <a:xfrm>
+            <a:off x="4788122" y="4330583"/>
+            <a:ext cx="301686" cy="369332"/>
+          </a:xfrm>
+          <a:prstGeom prst="rect">
+            <a:avLst/>
+          </a:prstGeom>
+          <a:noFill/>
+        </p:spPr>
+        <p:txBody>
+          <a:bodyPr wrap="square" rtlCol="0">
+            <a:spAutoFit/>
+          </a:bodyPr>
+          <a:lstStyle/>
+          <a:p>
+            <a:r>
+              <a:rPr kumimoji="1" lang="en-US" altLang="zh-CN" b="1" dirty="0">
+                <a:solidFill>
+                  <a:schemeClr val="bg1"/>
+                </a:solidFill>
+              </a:rPr>
+              <a:t>4</a:t>
+            </a:r>
+            <a:endParaRPr kumimoji="1" lang="zh-CN" altLang="en-US" b="1" dirty="0">
+              <a:solidFill>
+                <a:schemeClr val="bg1"/>
+              </a:solidFill>
+            </a:endParaRPr>
+          </a:p>
+        </p:txBody>
+      </p:sp>
+      <p:sp>
+        <p:nvSpPr>
+          <p:cNvPr id="19" name="文本框 18">
+            <a:extLst>
+              <a:ext uri="{FF2B5EF4-FFF2-40B4-BE49-F238E27FC236}">
+                <a16:creationId xmlns:a16="http://schemas.microsoft.com/office/drawing/2014/main" id="{37D03F87-9C12-A878-0EFC-E6086B73B1B6}"/>
+              </a:ext>
+            </a:extLst>
+          </p:cNvPr>
+          <p:cNvSpPr txBox="1"/>
+          <p:nvPr/>
+        </p:nvSpPr>
+        <p:spPr>
+          <a:xfrm>
+            <a:off x="6339979" y="4330583"/>
+            <a:ext cx="301686" cy="369332"/>
+          </a:xfrm>
+          <a:prstGeom prst="rect">
+            <a:avLst/>
+          </a:prstGeom>
+          <a:noFill/>
+        </p:spPr>
+        <p:txBody>
+          <a:bodyPr wrap="square" rtlCol="0">
+            <a:spAutoFit/>
+          </a:bodyPr>
+          <a:lstStyle/>
+          <a:p>
+            <a:r>
+              <a:rPr kumimoji="1" lang="en-US" altLang="zh-CN" b="1" dirty="0">
+                <a:solidFill>
+                  <a:schemeClr val="bg1"/>
+                </a:solidFill>
+              </a:rPr>
+              <a:t>6</a:t>
+            </a:r>
+            <a:endParaRPr kumimoji="1" lang="zh-CN" altLang="en-US" b="1" dirty="0">
+              <a:solidFill>
+                <a:schemeClr val="bg1"/>
+              </a:solidFill>
+            </a:endParaRPr>
+          </a:p>
+        </p:txBody>
+      </p:sp>
+      <p:sp>
+        <p:nvSpPr>
+          <p:cNvPr id="20" name="文本框 19">
+            <a:extLst>
+              <a:ext uri="{FF2B5EF4-FFF2-40B4-BE49-F238E27FC236}">
+                <a16:creationId xmlns:a16="http://schemas.microsoft.com/office/drawing/2014/main" id="{50DC3C98-459C-1F52-9C08-65FF2A2DAF95}"/>
+              </a:ext>
+            </a:extLst>
+          </p:cNvPr>
+          <p:cNvSpPr txBox="1"/>
+          <p:nvPr/>
+        </p:nvSpPr>
+        <p:spPr>
+          <a:xfrm>
+            <a:off x="7091093" y="4330583"/>
+            <a:ext cx="301686" cy="369332"/>
+          </a:xfrm>
+          <a:prstGeom prst="rect">
+            <a:avLst/>
+          </a:prstGeom>
+          <a:noFill/>
+        </p:spPr>
+        <p:txBody>
+          <a:bodyPr wrap="square" rtlCol="0">
+            <a:spAutoFit/>
+          </a:bodyPr>
+          <a:lstStyle/>
+          <a:p>
+            <a:r>
+              <a:rPr kumimoji="1" lang="en-US" altLang="zh-CN" b="1" dirty="0">
+                <a:solidFill>
+                  <a:schemeClr val="bg1"/>
+                </a:solidFill>
+              </a:rPr>
+              <a:t>7</a:t>
+            </a:r>
+            <a:endParaRPr kumimoji="1" lang="zh-CN" altLang="en-US" b="1" dirty="0">
+              <a:solidFill>
+                <a:schemeClr val="bg1"/>
+              </a:solidFill>
+            </a:endParaRPr>
+          </a:p>
+        </p:txBody>
+      </p:sp>
+    </p:spTree>
+    <p:extLst>
+      <p:ext uri="{BB962C8B-B14F-4D97-AF65-F5344CB8AC3E}">
+        <p14:creationId xmlns:p14="http://schemas.microsoft.com/office/powerpoint/2010/main" val="1120571938"/>
+      </p:ext>
+    </p:extLst>
+  </p:cSld>
+  <p:clrMapOvr>
+    <a:masterClrMapping/>
+  </p:clrMapOvr>
+  <p:timing>
+    <p:tnLst>
+      <p:par>
+        <p:cTn id="1" dur="indefinite" restart="never" nodeType="tmRoot">
+          <p:childTnLst>
+            <p:seq concurrent="1" nextAc="seek">
+              <p:cTn id="2" dur="indefinite" nodeType="mainSeq">
+                <p:childTnLst>
+                  <p:par>
+                    <p:cTn id="3" fill="hold">
+                      <p:stCondLst>
+                        <p:cond delay="indefinite"/>
+                      </p:stCondLst>
+                      <p:childTnLst>
+                        <p:par>
+                          <p:cTn id="4" fill="hold">
+                            <p:stCondLst>
+                              <p:cond delay="0"/>
+                            </p:stCondLst>
+                            <p:childTnLst>
+                              <p:par>
+                                <p:cTn id="5" presetID="1" presetClass="entr" presetSubtype="0" fill="hold" grpId="0" nodeType="clickEffect">
+                                  <p:stCondLst>
+                                    <p:cond delay="0"/>
+                                  </p:stCondLst>
+                                  <p:childTnLst>
+                                    <p:set>
+                                      <p:cBhvr>
+                                        <p:cTn id="6" dur="1" fill="hold">
+                                          <p:stCondLst>
+                                            <p:cond delay="0"/>
+                                          </p:stCondLst>
+                                        </p:cTn>
+                                        <p:tgtEl>
+                                          <p:spTgt spid="13"/>
+                                        </p:tgtEl>
+                                        <p:attrNameLst>
+                                          <p:attrName>style.visibility</p:attrName>
+                                        </p:attrNameLst>
+                                      </p:cBhvr>
+                                      <p:to>
+                                        <p:strVal val="visible"/>
+                                      </p:to>
+                                    </p:set>
+                                  </p:childTnLst>
+                                </p:cTn>
+                              </p:par>
+                            </p:childTnLst>
+                          </p:cTn>
+                        </p:par>
+                      </p:childTnLst>
+                    </p:cTn>
+                  </p:par>
+                  <p:par>
+                    <p:cTn id="7" fill="hold">
+                      <p:stCondLst>
+                        <p:cond delay="indefinite"/>
+                      </p:stCondLst>
+                      <p:childTnLst>
+                        <p:par>
+                          <p:cTn id="8" fill="hold">
+                            <p:stCondLst>
+                              <p:cond delay="0"/>
+                            </p:stCondLst>
+                            <p:childTnLst>
+                              <p:par>
+                                <p:cTn id="9" presetID="0" presetClass="path" presetSubtype="0" accel="50000" decel="50000" fill="hold" grpId="0" nodeType="clickEffect">
+                                  <p:stCondLst>
+                                    <p:cond delay="0"/>
+                                  </p:stCondLst>
+                                  <p:childTnLst>
+                                    <p:animMotion origin="layout" path="M 2.77778E-7 2.96296E-6 L 0.09132 0.00023 " pathEditMode="relative" rAng="0" ptsTypes="AA">
+                                      <p:cBhvr>
+                                        <p:cTn id="10" dur="2000" fill="hold"/>
+                                        <p:tgtEl>
+                                          <p:spTgt spid="9"/>
+                                        </p:tgtEl>
+                                        <p:attrNameLst>
+                                          <p:attrName>ppt_x</p:attrName>
+                                          <p:attrName>ppt_y</p:attrName>
+                                        </p:attrNameLst>
+                                      </p:cBhvr>
+                                      <p:rCtr x="4566" y="0"/>
+                                    </p:animMotion>
+                                  </p:childTnLst>
+                                </p:cTn>
+                              </p:par>
+                              <p:par>
+                                <p:cTn id="11" presetID="0" presetClass="path" presetSubtype="0" accel="50000" decel="50000" fill="hold" grpId="0" nodeType="withEffect">
+                                  <p:stCondLst>
+                                    <p:cond delay="0"/>
+                                  </p:stCondLst>
+                                  <p:childTnLst>
+                                    <p:animMotion origin="layout" path="M 0 0 L 0.08334 0 " pathEditMode="relative" ptsTypes="AA">
+                                      <p:cBhvr>
+                                        <p:cTn id="12" dur="2000" fill="hold"/>
+                                        <p:tgtEl>
+                                          <p:spTgt spid="11"/>
+                                        </p:tgtEl>
+                                        <p:attrNameLst>
+                                          <p:attrName>ppt_x</p:attrName>
+                                          <p:attrName>ppt_y</p:attrName>
+                                        </p:attrNameLst>
+                                      </p:cBhvr>
+                                    </p:animMotion>
+                                  </p:childTnLst>
+                                </p:cTn>
+                              </p:par>
+                            </p:childTnLst>
+                          </p:cTn>
+                        </p:par>
+                      </p:childTnLst>
+                    </p:cTn>
+                  </p:par>
+                  <p:par>
+                    <p:cTn id="13" fill="hold">
+                      <p:stCondLst>
+                        <p:cond delay="indefinite"/>
+                      </p:stCondLst>
+                      <p:childTnLst>
+                        <p:par>
+                          <p:cTn id="14" fill="hold">
+                            <p:stCondLst>
+                              <p:cond delay="0"/>
+                            </p:stCondLst>
+                            <p:childTnLst>
+                              <p:par>
+                                <p:cTn id="15" presetID="1" presetClass="entr" presetSubtype="0" fill="hold" nodeType="clickEffect">
+                                  <p:stCondLst>
+                                    <p:cond delay="0"/>
+                                  </p:stCondLst>
+                                  <p:childTnLst>
+                                    <p:set>
+                                      <p:cBhvr>
+                                        <p:cTn id="16" dur="1" fill="hold">
+                                          <p:stCondLst>
+                                            <p:cond delay="0"/>
+                                          </p:stCondLst>
+                                        </p:cTn>
+                                        <p:tgtEl>
+                                          <p:spTgt spid="14">
+                                            <p:txEl>
+                                              <p:pRg st="0" end="0"/>
+                                            </p:txEl>
+                                          </p:spTgt>
+                                        </p:tgtEl>
+                                        <p:attrNameLst>
+                                          <p:attrName>style.visibility</p:attrName>
+                                        </p:attrNameLst>
+                                      </p:cBhvr>
+                                      <p:to>
+                                        <p:strVal val="visible"/>
+                                      </p:to>
+                                    </p:set>
+                                  </p:childTnLst>
+                                </p:cTn>
+                              </p:par>
+                            </p:childTnLst>
+                          </p:cTn>
+                        </p:par>
+                      </p:childTnLst>
+                    </p:cTn>
+                  </p:par>
+                  <p:par>
+                    <p:cTn id="17" fill="hold">
+                      <p:stCondLst>
+                        <p:cond delay="indefinite"/>
+                      </p:stCondLst>
+                      <p:childTnLst>
+                        <p:par>
+                          <p:cTn id="18" fill="hold">
+                            <p:stCondLst>
+                              <p:cond delay="0"/>
+                            </p:stCondLst>
+                            <p:childTnLst>
+                              <p:par>
+                                <p:cTn id="19" presetID="0" presetClass="path" presetSubtype="0" accel="50000" decel="50000" fill="hold" grpId="0" nodeType="clickEffect">
+                                  <p:stCondLst>
+                                    <p:cond delay="0"/>
+                                  </p:stCondLst>
+                                  <p:childTnLst>
+                                    <p:animMotion origin="layout" path="M 0 0 L 0.09115 0 " pathEditMode="relative" ptsTypes="AA">
+                                      <p:cBhvr>
+                                        <p:cTn id="20" dur="2000" fill="hold"/>
+                                        <p:tgtEl>
+                                          <p:spTgt spid="7"/>
+                                        </p:tgtEl>
+                                        <p:attrNameLst>
+                                          <p:attrName>ppt_x</p:attrName>
+                                          <p:attrName>ppt_y</p:attrName>
+                                        </p:attrNameLst>
+                                      </p:cBhvr>
+                                    </p:animMotion>
+                                  </p:childTnLst>
+                                </p:cTn>
+                              </p:par>
+                              <p:par>
+                                <p:cTn id="21" presetID="0" presetClass="path" presetSubtype="0" accel="50000" decel="50000" fill="hold" grpId="1" nodeType="withEffect">
+                                  <p:stCondLst>
+                                    <p:cond delay="0"/>
+                                  </p:stCondLst>
+                                  <p:childTnLst>
+                                    <p:animMotion origin="layout" path="M 0.08333 0 L 0.1651 0 " pathEditMode="relative" rAng="0" ptsTypes="AA">
+                                      <p:cBhvr>
+                                        <p:cTn id="22" dur="2000" fill="hold"/>
+                                        <p:tgtEl>
+                                          <p:spTgt spid="11"/>
+                                        </p:tgtEl>
+                                        <p:attrNameLst>
+                                          <p:attrName>ppt_x</p:attrName>
+                                          <p:attrName>ppt_y</p:attrName>
+                                        </p:attrNameLst>
+                                      </p:cBhvr>
+                                      <p:rCtr x="4132" y="0"/>
+                                    </p:animMotion>
+                                  </p:childTnLst>
+                                </p:cTn>
+                              </p:par>
+                            </p:childTnLst>
+                          </p:cTn>
+                        </p:par>
+                      </p:childTnLst>
+                    </p:cTn>
+                  </p:par>
+                  <p:par>
+                    <p:cTn id="23" fill="hold">
+                      <p:stCondLst>
+                        <p:cond delay="indefinite"/>
+                      </p:stCondLst>
+                      <p:childTnLst>
+                        <p:par>
+                          <p:cTn id="24" fill="hold">
+                            <p:stCondLst>
+                              <p:cond delay="0"/>
+                            </p:stCondLst>
+                            <p:childTnLst>
+                              <p:par>
+                                <p:cTn id="25" presetID="1" presetClass="entr" presetSubtype="0" fill="hold" grpId="0" nodeType="clickEffect">
+                                  <p:stCondLst>
+                                    <p:cond delay="0"/>
+                                  </p:stCondLst>
+                                  <p:childTnLst>
+                                    <p:set>
+                                      <p:cBhvr>
+                                        <p:cTn id="26" dur="1" fill="hold">
+                                          <p:stCondLst>
+                                            <p:cond delay="0"/>
+                                          </p:stCondLst>
+                                        </p:cTn>
+                                        <p:tgtEl>
+                                          <p:spTgt spid="15"/>
+                                        </p:tgtEl>
+                                        <p:attrNameLst>
+                                          <p:attrName>style.visibility</p:attrName>
+                                        </p:attrNameLst>
+                                      </p:cBhvr>
+                                      <p:to>
+                                        <p:strVal val="visible"/>
+                                      </p:to>
+                                    </p:set>
+                                  </p:childTnLst>
+                                </p:cTn>
+                              </p:par>
+                            </p:childTnLst>
+                          </p:cTn>
+                        </p:par>
+                      </p:childTnLst>
+                    </p:cTn>
+                  </p:par>
+                  <p:par>
+                    <p:cTn id="27" fill="hold">
+                      <p:stCondLst>
+                        <p:cond delay="indefinite"/>
+                      </p:stCondLst>
+                      <p:childTnLst>
+                        <p:par>
+                          <p:cTn id="28" fill="hold">
+                            <p:stCondLst>
+                              <p:cond delay="0"/>
+                            </p:stCondLst>
+                            <p:childTnLst>
+                              <p:par>
+                                <p:cTn id="29" presetID="0" presetClass="path" presetSubtype="0" accel="50000" decel="50000" fill="hold" grpId="1" nodeType="clickEffect">
+                                  <p:stCondLst>
+                                    <p:cond delay="0"/>
+                                  </p:stCondLst>
+                                  <p:childTnLst>
+                                    <p:animMotion origin="layout" path="M 0.09132 0.00023 L 0.1849 0.00023 " pathEditMode="relative" rAng="0" ptsTypes="AA">
+                                      <p:cBhvr>
+                                        <p:cTn id="30" dur="2000" fill="hold"/>
+                                        <p:tgtEl>
+                                          <p:spTgt spid="9"/>
+                                        </p:tgtEl>
+                                        <p:attrNameLst>
+                                          <p:attrName>ppt_x</p:attrName>
+                                          <p:attrName>ppt_y</p:attrName>
+                                        </p:attrNameLst>
+                                      </p:cBhvr>
+                                      <p:rCtr x="4670" y="0"/>
+                                    </p:animMotion>
+                                  </p:childTnLst>
+                                </p:cTn>
+                              </p:par>
+                              <p:par>
+                                <p:cTn id="31" presetID="0" presetClass="path" presetSubtype="0" accel="50000" decel="50000" fill="hold" grpId="2" nodeType="withEffect">
+                                  <p:stCondLst>
+                                    <p:cond delay="0"/>
+                                  </p:stCondLst>
+                                  <p:childTnLst>
+                                    <p:animMotion origin="layout" path="M 0.1651 0 L 0.24792 0 " pathEditMode="relative" rAng="0" ptsTypes="AA">
+                                      <p:cBhvr>
+                                        <p:cTn id="32" dur="2000" fill="hold"/>
+                                        <p:tgtEl>
+                                          <p:spTgt spid="11"/>
+                                        </p:tgtEl>
+                                        <p:attrNameLst>
+                                          <p:attrName>ppt_x</p:attrName>
+                                          <p:attrName>ppt_y</p:attrName>
+                                        </p:attrNameLst>
+                                      </p:cBhvr>
+                                      <p:rCtr x="4132" y="0"/>
+                                    </p:animMotion>
+                                  </p:childTnLst>
+                                </p:cTn>
+                              </p:par>
+                            </p:childTnLst>
+                          </p:cTn>
+                        </p:par>
+                      </p:childTnLst>
+                    </p:cTn>
+                  </p:par>
+                  <p:par>
+                    <p:cTn id="33" fill="hold">
+                      <p:stCondLst>
+                        <p:cond delay="indefinite"/>
+                      </p:stCondLst>
+                      <p:childTnLst>
+                        <p:par>
+                          <p:cTn id="34" fill="hold">
+                            <p:stCondLst>
+                              <p:cond delay="0"/>
+                            </p:stCondLst>
+                            <p:childTnLst>
+                              <p:par>
+                                <p:cTn id="35" presetID="1" presetClass="entr" presetSubtype="0" fill="hold" grpId="0" nodeType="clickEffect">
+                                  <p:stCondLst>
+                                    <p:cond delay="0"/>
+                                  </p:stCondLst>
+                                  <p:childTnLst>
+                                    <p:set>
+                                      <p:cBhvr>
+                                        <p:cTn id="36" dur="1" fill="hold">
+                                          <p:stCondLst>
+                                            <p:cond delay="0"/>
+                                          </p:stCondLst>
+                                        </p:cTn>
+                                        <p:tgtEl>
+                                          <p:spTgt spid="16"/>
+                                        </p:tgtEl>
+                                        <p:attrNameLst>
+                                          <p:attrName>style.visibility</p:attrName>
+                                        </p:attrNameLst>
+                                      </p:cBhvr>
+                                      <p:to>
+                                        <p:strVal val="visible"/>
+                                      </p:to>
+                                    </p:set>
+                                  </p:childTnLst>
+                                </p:cTn>
+                              </p:par>
+                            </p:childTnLst>
+                          </p:cTn>
+                        </p:par>
+                      </p:childTnLst>
+                    </p:cTn>
+                  </p:par>
+                  <p:par>
+                    <p:cTn id="37" fill="hold">
+                      <p:stCondLst>
+                        <p:cond delay="indefinite"/>
+                      </p:stCondLst>
+                      <p:childTnLst>
+                        <p:par>
+                          <p:cTn id="38" fill="hold">
+                            <p:stCondLst>
+                              <p:cond delay="0"/>
+                            </p:stCondLst>
+                            <p:childTnLst>
+                              <p:par>
+                                <p:cTn id="39" presetID="0" presetClass="path" presetSubtype="0" accel="50000" decel="50000" fill="hold" grpId="2" nodeType="clickEffect">
+                                  <p:stCondLst>
+                                    <p:cond delay="0"/>
+                                  </p:stCondLst>
+                                  <p:childTnLst>
+                                    <p:animMotion origin="layout" path="M 0.1849 0.00023 L 0.28281 2.96296E-6 " pathEditMode="relative" rAng="0" ptsTypes="AA">
+                                      <p:cBhvr>
+                                        <p:cTn id="40" dur="2000" fill="hold"/>
+                                        <p:tgtEl>
+                                          <p:spTgt spid="9"/>
+                                        </p:tgtEl>
+                                        <p:attrNameLst>
+                                          <p:attrName>ppt_x</p:attrName>
+                                          <p:attrName>ppt_y</p:attrName>
+                                        </p:attrNameLst>
+                                      </p:cBhvr>
+                                      <p:rCtr x="4896" y="-23"/>
+                                    </p:animMotion>
+                                  </p:childTnLst>
+                                </p:cTn>
+                              </p:par>
+                              <p:par>
+                                <p:cTn id="41" presetID="0" presetClass="path" presetSubtype="0" accel="50000" decel="50000" fill="hold" grpId="3" nodeType="withEffect">
+                                  <p:stCondLst>
+                                    <p:cond delay="0"/>
+                                  </p:stCondLst>
+                                  <p:childTnLst>
+                                    <p:animMotion origin="layout" path="M 0.24792 0 L 0.33177 0 " pathEditMode="relative" rAng="0" ptsTypes="AA">
+                                      <p:cBhvr>
+                                        <p:cTn id="42" dur="2000" fill="hold"/>
+                                        <p:tgtEl>
+                                          <p:spTgt spid="11"/>
+                                        </p:tgtEl>
+                                        <p:attrNameLst>
+                                          <p:attrName>ppt_x</p:attrName>
+                                          <p:attrName>ppt_y</p:attrName>
+                                        </p:attrNameLst>
+                                      </p:cBhvr>
+                                      <p:rCtr x="4184" y="0"/>
+                                    </p:animMotion>
+                                  </p:childTnLst>
+                                </p:cTn>
+                              </p:par>
+                            </p:childTnLst>
+                          </p:cTn>
+                        </p:par>
+                      </p:childTnLst>
+                    </p:cTn>
+                  </p:par>
+                  <p:par>
+                    <p:cTn id="43" fill="hold">
+                      <p:stCondLst>
+                        <p:cond delay="indefinite"/>
+                      </p:stCondLst>
+                      <p:childTnLst>
+                        <p:par>
+                          <p:cTn id="44" fill="hold">
+                            <p:stCondLst>
+                              <p:cond delay="0"/>
+                            </p:stCondLst>
+                            <p:childTnLst>
+                              <p:par>
+                                <p:cTn id="45" presetID="1" presetClass="entr" presetSubtype="0" fill="hold" grpId="0" nodeType="clickEffect">
+                                  <p:stCondLst>
+                                    <p:cond delay="0"/>
+                                  </p:stCondLst>
+                                  <p:childTnLst>
+                                    <p:set>
+                                      <p:cBhvr>
+                                        <p:cTn id="46" dur="1" fill="hold">
+                                          <p:stCondLst>
+                                            <p:cond delay="0"/>
+                                          </p:stCondLst>
+                                        </p:cTn>
+                                        <p:tgtEl>
+                                          <p:spTgt spid="18"/>
+                                        </p:tgtEl>
+                                        <p:attrNameLst>
+                                          <p:attrName>style.visibility</p:attrName>
+                                        </p:attrNameLst>
+                                      </p:cBhvr>
+                                      <p:to>
+                                        <p:strVal val="visible"/>
+                                      </p:to>
+                                    </p:set>
+                                  </p:childTnLst>
+                                </p:cTn>
+                              </p:par>
+                            </p:childTnLst>
+                          </p:cTn>
+                        </p:par>
+                      </p:childTnLst>
+                    </p:cTn>
+                  </p:par>
+                  <p:par>
+                    <p:cTn id="47" fill="hold">
+                      <p:stCondLst>
+                        <p:cond delay="indefinite"/>
+                      </p:stCondLst>
+                      <p:childTnLst>
+                        <p:par>
+                          <p:cTn id="48" fill="hold">
+                            <p:stCondLst>
+                              <p:cond delay="0"/>
+                            </p:stCondLst>
+                            <p:childTnLst>
+                              <p:par>
+                                <p:cTn id="49" presetID="0" presetClass="path" presetSubtype="0" accel="50000" decel="50000" fill="hold" grpId="1" nodeType="clickEffect">
+                                  <p:stCondLst>
+                                    <p:cond delay="0"/>
+                                  </p:stCondLst>
+                                  <p:childTnLst>
+                                    <p:animMotion origin="layout" path="M 0.09115 2.96296E-6 L 0.18107 2.96296E-6 " pathEditMode="relative" rAng="0" ptsTypes="AA">
+                                      <p:cBhvr>
+                                        <p:cTn id="50" dur="2000" fill="hold"/>
+                                        <p:tgtEl>
+                                          <p:spTgt spid="7"/>
+                                        </p:tgtEl>
+                                        <p:attrNameLst>
+                                          <p:attrName>ppt_x</p:attrName>
+                                          <p:attrName>ppt_y</p:attrName>
+                                        </p:attrNameLst>
+                                      </p:cBhvr>
+                                      <p:rCtr x="4462" y="0"/>
+                                    </p:animMotion>
+                                  </p:childTnLst>
+                                </p:cTn>
+                              </p:par>
+                              <p:par>
+                                <p:cTn id="51" presetID="0" presetClass="path" presetSubtype="0" accel="50000" decel="50000" fill="hold" grpId="4" nodeType="withEffect">
+                                  <p:stCondLst>
+                                    <p:cond delay="0"/>
+                                  </p:stCondLst>
+                                  <p:childTnLst>
+                                    <p:animMotion origin="layout" path="M 0.33177 0 L 0.41649 0 " pathEditMode="relative" rAng="0" ptsTypes="AA">
+                                      <p:cBhvr>
+                                        <p:cTn id="52" dur="2000" fill="hold"/>
+                                        <p:tgtEl>
+                                          <p:spTgt spid="11"/>
+                                        </p:tgtEl>
+                                        <p:attrNameLst>
+                                          <p:attrName>ppt_x</p:attrName>
+                                          <p:attrName>ppt_y</p:attrName>
+                                        </p:attrNameLst>
+                                      </p:cBhvr>
+                                      <p:rCtr x="4219" y="0"/>
+                                    </p:animMotion>
+                                  </p:childTnLst>
+                                </p:cTn>
+                              </p:par>
+                            </p:childTnLst>
+                          </p:cTn>
+                        </p:par>
+                      </p:childTnLst>
+                    </p:cTn>
+                  </p:par>
+                  <p:par>
+                    <p:cTn id="53" fill="hold">
+                      <p:stCondLst>
+                        <p:cond delay="indefinite"/>
+                      </p:stCondLst>
+                      <p:childTnLst>
+                        <p:par>
+                          <p:cTn id="54" fill="hold">
+                            <p:stCondLst>
+                              <p:cond delay="0"/>
+                            </p:stCondLst>
+                            <p:childTnLst>
+                              <p:par>
+                                <p:cTn id="55" presetID="1" presetClass="entr" presetSubtype="0" fill="hold" grpId="0" nodeType="clickEffect">
+                                  <p:stCondLst>
+                                    <p:cond delay="0"/>
+                                  </p:stCondLst>
+                                  <p:childTnLst>
+                                    <p:set>
+                                      <p:cBhvr>
+                                        <p:cTn id="56" dur="1" fill="hold">
+                                          <p:stCondLst>
+                                            <p:cond delay="0"/>
+                                          </p:stCondLst>
+                                        </p:cTn>
+                                        <p:tgtEl>
+                                          <p:spTgt spid="17"/>
+                                        </p:tgtEl>
+                                        <p:attrNameLst>
+                                          <p:attrName>style.visibility</p:attrName>
+                                        </p:attrNameLst>
+                                      </p:cBhvr>
+                                      <p:to>
+                                        <p:strVal val="visible"/>
+                                      </p:to>
+                                    </p:set>
+                                  </p:childTnLst>
+                                </p:cTn>
+                              </p:par>
+                            </p:childTnLst>
+                          </p:cTn>
+                        </p:par>
+                      </p:childTnLst>
+                    </p:cTn>
+                  </p:par>
+                  <p:par>
+                    <p:cTn id="57" fill="hold">
+                      <p:stCondLst>
+                        <p:cond delay="indefinite"/>
+                      </p:stCondLst>
+                      <p:childTnLst>
+                        <p:par>
+                          <p:cTn id="58" fill="hold">
+                            <p:stCondLst>
+                              <p:cond delay="0"/>
+                            </p:stCondLst>
+                            <p:childTnLst>
+                              <p:par>
+                                <p:cTn id="59" presetID="0" presetClass="path" presetSubtype="0" accel="50000" decel="50000" fill="hold" grpId="2" nodeType="clickEffect">
+                                  <p:stCondLst>
+                                    <p:cond delay="0"/>
+                                  </p:stCondLst>
+                                  <p:childTnLst>
+                                    <p:animMotion origin="layout" path="M 0.18108 2.96296E-6 L 0.27552 2.96296E-6 " pathEditMode="relative" rAng="0" ptsTypes="AA">
+                                      <p:cBhvr>
+                                        <p:cTn id="60" dur="2000" fill="hold"/>
+                                        <p:tgtEl>
+                                          <p:spTgt spid="7"/>
+                                        </p:tgtEl>
+                                        <p:attrNameLst>
+                                          <p:attrName>ppt_x</p:attrName>
+                                          <p:attrName>ppt_y</p:attrName>
+                                        </p:attrNameLst>
+                                      </p:cBhvr>
+                                      <p:rCtr x="4462" y="0"/>
+                                    </p:animMotion>
+                                  </p:childTnLst>
+                                </p:cTn>
+                              </p:par>
+                              <p:par>
+                                <p:cTn id="61" presetID="0" presetClass="path" presetSubtype="0" accel="50000" decel="50000" fill="hold" grpId="5" nodeType="withEffect">
+                                  <p:stCondLst>
+                                    <p:cond delay="0"/>
+                                  </p:stCondLst>
+                                  <p:childTnLst>
+                                    <p:animMotion origin="layout" path="M 0.41649 0 L 0.50069 0 " pathEditMode="relative" rAng="0" ptsTypes="AA">
+                                      <p:cBhvr>
+                                        <p:cTn id="62" dur="2000" fill="hold"/>
+                                        <p:tgtEl>
+                                          <p:spTgt spid="11"/>
+                                        </p:tgtEl>
+                                        <p:attrNameLst>
+                                          <p:attrName>ppt_x</p:attrName>
+                                          <p:attrName>ppt_y</p:attrName>
+                                        </p:attrNameLst>
+                                      </p:cBhvr>
+                                      <p:rCtr x="4201" y="0"/>
+                                    </p:animMotion>
+                                  </p:childTnLst>
+                                </p:cTn>
+                              </p:par>
+                            </p:childTnLst>
+                          </p:cTn>
+                        </p:par>
+                      </p:childTnLst>
+                    </p:cTn>
+                  </p:par>
+                  <p:par>
+                    <p:cTn id="63" fill="hold">
+                      <p:stCondLst>
+                        <p:cond delay="indefinite"/>
+                      </p:stCondLst>
+                      <p:childTnLst>
+                        <p:par>
+                          <p:cTn id="64" fill="hold">
+                            <p:stCondLst>
+                              <p:cond delay="0"/>
+                            </p:stCondLst>
+                            <p:childTnLst>
+                              <p:par>
+                                <p:cTn id="65" presetID="1" presetClass="entr" presetSubtype="0" fill="hold" grpId="0" nodeType="clickEffect">
+                                  <p:stCondLst>
+                                    <p:cond delay="0"/>
+                                  </p:stCondLst>
+                                  <p:childTnLst>
+                                    <p:set>
+                                      <p:cBhvr>
+                                        <p:cTn id="66" dur="1" fill="hold">
+                                          <p:stCondLst>
+                                            <p:cond delay="0"/>
+                                          </p:stCondLst>
+                                        </p:cTn>
+                                        <p:tgtEl>
+                                          <p:spTgt spid="19"/>
+                                        </p:tgtEl>
+                                        <p:attrNameLst>
+                                          <p:attrName>style.visibility</p:attrName>
+                                        </p:attrNameLst>
+                                      </p:cBhvr>
+                                      <p:to>
+                                        <p:strVal val="visible"/>
+                                      </p:to>
+                                    </p:set>
+                                  </p:childTnLst>
+                                </p:cTn>
+                              </p:par>
+                            </p:childTnLst>
+                          </p:cTn>
+                        </p:par>
+                      </p:childTnLst>
+                    </p:cTn>
+                  </p:par>
+                  <p:par>
+                    <p:cTn id="67" fill="hold">
+                      <p:stCondLst>
+                        <p:cond delay="indefinite"/>
+                      </p:stCondLst>
+                      <p:childTnLst>
+                        <p:par>
+                          <p:cTn id="68" fill="hold">
+                            <p:stCondLst>
+                              <p:cond delay="0"/>
+                            </p:stCondLst>
+                            <p:childTnLst>
+                              <p:par>
+                                <p:cTn id="69" presetID="0" presetClass="path" presetSubtype="0" accel="50000" decel="50000" fill="hold" grpId="3" nodeType="clickEffect">
+                                  <p:stCondLst>
+                                    <p:cond delay="0"/>
+                                  </p:stCondLst>
+                                  <p:childTnLst>
+                                    <p:animMotion origin="layout" path="M 0.28281 2.96296E-6 L 0.36337 2.96296E-6 " pathEditMode="relative" rAng="0" ptsTypes="AA">
+                                      <p:cBhvr>
+                                        <p:cTn id="70" dur="2000" fill="hold"/>
+                                        <p:tgtEl>
+                                          <p:spTgt spid="9"/>
+                                        </p:tgtEl>
+                                        <p:attrNameLst>
+                                          <p:attrName>ppt_x</p:attrName>
+                                          <p:attrName>ppt_y</p:attrName>
+                                        </p:attrNameLst>
+                                      </p:cBhvr>
+                                      <p:rCtr x="4045" y="0"/>
+                                    </p:animMotion>
+                                  </p:childTnLst>
+                                </p:cTn>
+                              </p:par>
+                              <p:par>
+                                <p:cTn id="71" presetID="0" presetClass="path" presetSubtype="0" accel="50000" decel="50000" fill="hold" grpId="6" nodeType="withEffect">
+                                  <p:stCondLst>
+                                    <p:cond delay="0"/>
+                                  </p:stCondLst>
+                                  <p:childTnLst>
+                                    <p:animMotion origin="layout" path="M 0.5007 0 L 0.58455 0 " pathEditMode="relative" rAng="0" ptsTypes="AA">
+                                      <p:cBhvr>
+                                        <p:cTn id="72" dur="2000" fill="hold"/>
+                                        <p:tgtEl>
+                                          <p:spTgt spid="11"/>
+                                        </p:tgtEl>
+                                        <p:attrNameLst>
+                                          <p:attrName>ppt_x</p:attrName>
+                                          <p:attrName>ppt_y</p:attrName>
+                                        </p:attrNameLst>
+                                      </p:cBhvr>
+                                      <p:rCtr x="4115" y="0"/>
+                                    </p:animMotion>
+                                  </p:childTnLst>
+                                </p:cTn>
+                              </p:par>
+                            </p:childTnLst>
+                          </p:cTn>
+                        </p:par>
+                      </p:childTnLst>
+                    </p:cTn>
+                  </p:par>
+                  <p:par>
+                    <p:cTn id="73" fill="hold">
+                      <p:stCondLst>
+                        <p:cond delay="indefinite"/>
+                      </p:stCondLst>
+                      <p:childTnLst>
+                        <p:par>
+                          <p:cTn id="74" fill="hold">
+                            <p:stCondLst>
+                              <p:cond delay="0"/>
+                            </p:stCondLst>
+                            <p:childTnLst>
+                              <p:par>
+                                <p:cTn id="75" presetID="1" presetClass="entr" presetSubtype="0" fill="hold" grpId="0" nodeType="clickEffect">
+                                  <p:stCondLst>
+                                    <p:cond delay="0"/>
+                                  </p:stCondLst>
+                                  <p:childTnLst>
+                                    <p:set>
+                                      <p:cBhvr>
+                                        <p:cTn id="76" dur="1" fill="hold">
+                                          <p:stCondLst>
+                                            <p:cond delay="0"/>
+                                          </p:stCondLst>
+                                        </p:cTn>
+                                        <p:tgtEl>
+                                          <p:spTgt spid="20"/>
+                                        </p:tgtEl>
+                                        <p:attrNameLst>
+                                          <p:attrName>style.visibility</p:attrName>
+                                        </p:attrNameLst>
+                                      </p:cBhvr>
+                                      <p:to>
+                                        <p:strVal val="visible"/>
+                                      </p:to>
+                                    </p:set>
+                                  </p:childTnLst>
+                                </p:cTn>
+                              </p:par>
+                            </p:childTnLst>
+                          </p:cTn>
+                        </p:par>
+                      </p:childTnLst>
+                    </p:cTn>
+                  </p:par>
+                  <p:par>
+                    <p:cTn id="77" fill="hold">
+                      <p:stCondLst>
+                        <p:cond delay="indefinite"/>
+                      </p:stCondLst>
+                      <p:childTnLst>
+                        <p:par>
+                          <p:cTn id="78" fill="hold">
+                            <p:stCondLst>
+                              <p:cond delay="0"/>
+                            </p:stCondLst>
+                            <p:childTnLst>
+                              <p:par>
+                                <p:cTn id="79" presetID="0" presetClass="path" presetSubtype="0" accel="50000" decel="50000" fill="hold" grpId="3" nodeType="clickEffect">
+                                  <p:stCondLst>
+                                    <p:cond delay="0"/>
+                                  </p:stCondLst>
+                                  <p:childTnLst>
+                                    <p:animMotion origin="layout" path="M 0.27552 2.96296E-6 L 0.36371 2.96296E-6 " pathEditMode="relative" rAng="0" ptsTypes="AA">
+                                      <p:cBhvr>
+                                        <p:cTn id="80" dur="2000" fill="hold"/>
+                                        <p:tgtEl>
+                                          <p:spTgt spid="7"/>
+                                        </p:tgtEl>
+                                        <p:attrNameLst>
+                                          <p:attrName>ppt_x</p:attrName>
+                                          <p:attrName>ppt_y</p:attrName>
+                                        </p:attrNameLst>
+                                      </p:cBhvr>
+                                      <p:rCtr x="4358" y="0"/>
+                                    </p:animMotion>
+                                  </p:childTnLst>
+                                </p:cTn>
+                              </p:par>
+                              <p:par>
+                                <p:cTn id="81" presetID="0" presetClass="path" presetSubtype="0" accel="50000" decel="50000" fill="hold" grpId="7" nodeType="withEffect">
+                                  <p:stCondLst>
+                                    <p:cond delay="0"/>
+                                  </p:stCondLst>
+                                  <p:childTnLst>
+                                    <p:animMotion origin="layout" path="M 0.58455 0 L 0.66267 0 " pathEditMode="relative" rAng="0" ptsTypes="AA">
+                                      <p:cBhvr>
+                                        <p:cTn id="82" dur="2000" fill="hold"/>
+                                        <p:tgtEl>
+                                          <p:spTgt spid="11"/>
+                                        </p:tgtEl>
+                                        <p:attrNameLst>
+                                          <p:attrName>ppt_x</p:attrName>
+                                          <p:attrName>ppt_y</p:attrName>
+                                        </p:attrNameLst>
+                                      </p:cBhvr>
+                                      <p:rCtr x="3906" y="0"/>
+                                    </p:animMotion>
+                                  </p:childTnLst>
+                                </p:cTn>
+                              </p:par>
+                            </p:childTnLst>
+                          </p:cTn>
+                        </p:par>
+                      </p:childTnLst>
+                    </p:cTn>
+                  </p:par>
+                </p:childTnLst>
+              </p:cTn>
+              <p:prevCondLst>
+                <p:cond evt="onPrev" delay="0">
+                  <p:tgtEl>
+                    <p:sldTgt/>
+                  </p:tgtEl>
+                </p:cond>
+              </p:prevCondLst>
+              <p:nextCondLst>
+                <p:cond evt="onNext" delay="0">
+                  <p:tgtEl>
+                    <p:sldTgt/>
+                  </p:tgtEl>
+                </p:cond>
+              </p:nextCondLst>
+            </p:seq>
+          </p:childTnLst>
+        </p:cTn>
+      </p:par>
+    </p:tnLst>
+    <p:bldLst>
+      <p:bldP spid="7" grpId="0"/>
+      <p:bldP spid="7" grpId="1"/>
+      <p:bldP spid="7" grpId="2"/>
+      <p:bldP spid="7" grpId="3"/>
+      <p:bldP spid="9" grpId="0"/>
+      <p:bldP spid="9" grpId="1"/>
+      <p:bldP spid="9" grpId="2"/>
+      <p:bldP spid="9" grpId="3"/>
+      <p:bldP spid="11" grpId="0"/>
+      <p:bldP spid="11" grpId="1"/>
+      <p:bldP spid="11" grpId="2"/>
+      <p:bldP spid="11" grpId="3"/>
+      <p:bldP spid="11" grpId="4"/>
+      <p:bldP spid="11" grpId="5"/>
+      <p:bldP spid="11" grpId="6"/>
+      <p:bldP spid="11" grpId="7"/>
+      <p:bldP spid="13" grpId="0"/>
+      <p:bldP spid="15" grpId="0"/>
+      <p:bldP spid="16" grpId="0"/>
+      <p:bldP spid="17" grpId="0"/>
+      <p:bldP spid="18" grpId="0"/>
+      <p:bldP spid="19" grpId="0"/>
+      <p:bldP spid="20" grpId="0"/>
+    </p:bldLst>
+  </p:timing>
 </p:sld>
 </file>
 

</xml_diff>